<commit_message>
Add an anchor to the slides so you can add from there
</commit_message>
<xml_diff>
--- a/src/presentation/unsuphology.pptx
+++ b/src/presentation/unsuphology.pptx
@@ -17,6 +17,8 @@
     <p:sldId id="265" r:id="rId11"/>
     <p:sldId id="266" r:id="rId12"/>
     <p:sldId id="267" r:id="rId13"/>
+    <p:sldId id="270" r:id="rId14"/>
+    <p:sldId id="269" r:id="rId15"/>
   </p:sldIdLst>
   <p:sldSz cx="9144000" cy="6858000" type="screen4x3"/>
   <p:notesSz cx="6858000" cy="9144000"/>
@@ -3176,13 +3178,8 @@
             <a:pPr algn="ctr"/>
             <a:r>
               <a:rPr lang="en-US" dirty="0" smtClean="0"/>
-              <a:t>Tom </a:t>
-            </a:r>
-            <a:r>
-              <a:rPr lang="en-US" dirty="0" smtClean="0"/>
-              <a:t>Kocmi</a:t>
-            </a:r>
-            <a:endParaRPr lang="en-US" dirty="0" smtClean="0"/>
+              <a:t>Tom Kocmi</a:t>
+            </a:r>
           </a:p>
           <a:p>
             <a:pPr algn="ctr"/>
@@ -3195,13 +3192,8 @@
             <a:pPr algn="ctr"/>
             <a:r>
               <a:rPr lang="en-US" dirty="0" smtClean="0"/>
-              <a:t>Natalia </a:t>
-            </a:r>
-            <a:r>
-              <a:rPr lang="en-US" dirty="0" smtClean="0"/>
-              <a:t>Klyueva</a:t>
-            </a:r>
-            <a:endParaRPr lang="en-US" dirty="0" smtClean="0"/>
+              <a:t>Natalia Klyueva</a:t>
+            </a:r>
           </a:p>
           <a:p>
             <a:pPr algn="ctr"/>
@@ -3326,13 +3318,8 @@
             </a:r>
             <a:r>
               <a:rPr lang="en-US" dirty="0" smtClean="0"/>
-              <a:t>longest common </a:t>
-            </a:r>
-            <a:r>
-              <a:rPr lang="en-US" dirty="0" smtClean="0"/>
-              <a:t>subsrings</a:t>
-            </a:r>
-            <a:endParaRPr lang="en-US" dirty="0" smtClean="0"/>
+              <a:t>longest common subsrings</a:t>
+            </a:r>
           </a:p>
           <a:p>
             <a:pPr lvl="1"/>
@@ -3362,11 +3349,7 @@
             </a:r>
             <a:r>
               <a:rPr lang="en-US" b="1" dirty="0" smtClean="0"/>
-              <a:t>b</a:t>
-            </a:r>
-            <a:r>
-              <a:rPr lang="en-US" b="1" dirty="0" smtClean="0"/>
-              <a:t> *  </a:t>
+              <a:t>b *  </a:t>
             </a:r>
             <a:r>
               <a:rPr lang="en-US" dirty="0" smtClean="0"/>
@@ -3390,23 +3373,11 @@
             </a:r>
             <a:r>
               <a:rPr lang="en-US" b="1" dirty="0" smtClean="0"/>
-              <a:t>b</a:t>
-            </a:r>
-            <a:r>
-              <a:rPr lang="en-US" b="1" dirty="0" smtClean="0"/>
-              <a:t> -&gt; </a:t>
-            </a:r>
-            <a:r>
-              <a:rPr lang="en-US" dirty="0" smtClean="0"/>
-              <a:t>[</a:t>
-            </a:r>
-            <a:r>
-              <a:rPr lang="en-US" dirty="0" smtClean="0"/>
-              <a:t>k,t,b</a:t>
-            </a:r>
-            <a:r>
-              <a:rPr lang="en-US" dirty="0" smtClean="0"/>
-              <a:t>]</a:t>
+              <a:t>b -&gt; </a:t>
+            </a:r>
+            <a:r>
+              <a:rPr lang="en-US" dirty="0" smtClean="0"/>
+              <a:t>[k,t,b]</a:t>
             </a:r>
           </a:p>
           <a:p>
@@ -3425,55 +3396,7 @@
             <a:pPr lvl="1"/>
             <a:r>
               <a:rPr lang="en-US" dirty="0" smtClean="0"/>
-              <a:t>Sava * </a:t>
-            </a:r>
-            <a:r>
-              <a:rPr lang="en-US" dirty="0" smtClean="0"/>
-              <a:t>ni</a:t>
-            </a:r>
-            <a:r>
-              <a:rPr lang="en-US" dirty="0" smtClean="0"/>
-              <a:t> – </a:t>
-            </a:r>
-            <a:r>
-              <a:rPr lang="en-US" dirty="0" smtClean="0"/>
-              <a:t>sava</a:t>
-            </a:r>
-            <a:r>
-              <a:rPr lang="en-US" dirty="0" smtClean="0"/>
-              <a:t> * </a:t>
-            </a:r>
-            <a:r>
-              <a:rPr lang="en-US" dirty="0" smtClean="0"/>
-              <a:t>va</a:t>
-            </a:r>
-            <a:r>
-              <a:rPr lang="en-US" dirty="0" smtClean="0"/>
-              <a:t> </a:t>
-            </a:r>
-            <a:r>
-              <a:rPr lang="en-US" dirty="0" smtClean="0"/>
-              <a:t>ni</a:t>
-            </a:r>
-            <a:r>
-              <a:rPr lang="en-US" dirty="0" smtClean="0"/>
-              <a:t>* -&gt; [</a:t>
-            </a:r>
-            <a:r>
-              <a:rPr lang="en-US" dirty="0" smtClean="0"/>
-              <a:t>sava</a:t>
-            </a:r>
-            <a:r>
-              <a:rPr lang="en-US" dirty="0" smtClean="0"/>
-              <a:t>, </a:t>
-            </a:r>
-            <a:r>
-              <a:rPr lang="en-US" dirty="0" smtClean="0"/>
-              <a:t>ni</a:t>
-            </a:r>
-            <a:r>
-              <a:rPr lang="en-US" dirty="0" smtClean="0"/>
-              <a:t>]</a:t>
+              <a:t>Sava * ni – sava * va ni* -&gt; [sava, ni]</a:t>
             </a:r>
           </a:p>
           <a:p>
@@ -3594,17 +3517,8 @@
             </a:r>
             <a:r>
               <a:rPr lang="en-US" i="1" dirty="0" smtClean="0"/>
-              <a:t>itab</a:t>
-            </a:r>
-            <a:r>
-              <a:rPr lang="en-US" i="1" dirty="0" smtClean="0"/>
-              <a:t> – </a:t>
-            </a:r>
-            <a:r>
-              <a:rPr lang="en-US" i="1" dirty="0" smtClean="0"/>
-              <a:t>butuk</a:t>
-            </a:r>
-            <a:endParaRPr lang="en-US" i="1" dirty="0" smtClean="0"/>
+              <a:t>itab – butuk</a:t>
+            </a:r>
           </a:p>
           <a:p>
             <a:pPr lvl="2"/>
@@ -3618,29 +3532,19 @@
             </a:r>
             <a:r>
               <a:rPr lang="en-US" dirty="0" smtClean="0"/>
-              <a:t>in </a:t>
-            </a:r>
-            <a:r>
-              <a:rPr lang="en-US" dirty="0" smtClean="0"/>
-              <a:t>kitab</a:t>
-            </a:r>
-            <a:endParaRPr lang="en-US" dirty="0" smtClean="0"/>
+              <a:t>in kitab</a:t>
+            </a:r>
           </a:p>
           <a:p>
             <a:pPr lvl="2"/>
             <a:r>
               <a:rPr lang="en-US" dirty="0" smtClean="0"/>
-              <a:t>We found a match at the end of </a:t>
-            </a:r>
-            <a:r>
-              <a:rPr lang="en-US" dirty="0" smtClean="0"/>
-              <a:t>butu</a:t>
+              <a:t>We found a match at the end of butu</a:t>
             </a:r>
             <a:r>
               <a:rPr lang="en-US" b="1" dirty="0" smtClean="0"/>
               <a:t>k</a:t>
             </a:r>
-            <a:endParaRPr lang="en-US" b="1" dirty="0" smtClean="0"/>
           </a:p>
           <a:p>
             <a:pPr lvl="2"/>
@@ -3772,25 +3676,13 @@
             <a:pPr lvl="2"/>
             <a:r>
               <a:rPr lang="en-US" dirty="0" smtClean="0"/>
-              <a:t>Treats English like an </a:t>
-            </a:r>
-            <a:r>
-              <a:rPr lang="en-US" dirty="0" smtClean="0"/>
-              <a:t>affixal</a:t>
-            </a:r>
-            <a:r>
-              <a:rPr lang="en-US" dirty="0" smtClean="0"/>
-              <a:t> language</a:t>
-            </a:r>
-          </a:p>
-          <a:p>
-            <a:r>
-              <a:rPr lang="en-US" dirty="0" smtClean="0"/>
-              <a:t>It is </a:t>
-            </a:r>
-            <a:r>
-              <a:rPr lang="en-US" dirty="0" smtClean="0"/>
-              <a:t>slow</a:t>
+              <a:t>Treats English like an affixal language</a:t>
+            </a:r>
+          </a:p>
+          <a:p>
+            <a:r>
+              <a:rPr lang="en-US" dirty="0" smtClean="0"/>
+              <a:t>It is slow</a:t>
             </a:r>
           </a:p>
           <a:p>
@@ -3799,7 +3691,6 @@
               <a:rPr lang="en-US" dirty="0" smtClean="0"/>
               <a:t> x4 slower than the initial implementation</a:t>
             </a:r>
-            <a:endParaRPr lang="en-US" dirty="0" smtClean="0"/>
           </a:p>
         </p:txBody>
       </p:sp>
@@ -3823,6 +3714,206 @@
 </p:sld>
 </file>
 
+<file path=ppt/slides/slide13.xml><?xml version="1.0" encoding="utf-8"?>
+<p:sld xmlns:a="http://schemas.openxmlformats.org/drawingml/2006/main" xmlns:r="http://schemas.openxmlformats.org/officeDocument/2006/relationships" xmlns:p="http://schemas.openxmlformats.org/presentationml/2006/main">
+  <p:cSld>
+    <p:spTree>
+      <p:nvGrpSpPr>
+        <p:cNvPr id="1" name=""/>
+        <p:cNvGrpSpPr/>
+        <p:nvPr/>
+      </p:nvGrpSpPr>
+      <p:grpSpPr>
+        <a:xfrm>
+          <a:off x="0" y="0"/>
+          <a:ext cx="0" cy="0"/>
+          <a:chOff x="0" y="0"/>
+          <a:chExt cx="0" cy="0"/>
+        </a:xfrm>
+      </p:grpSpPr>
+      <p:sp>
+        <p:nvSpPr>
+          <p:cNvPr id="2" name="Title 1"/>
+          <p:cNvSpPr>
+            <a:spLocks noGrp="1"/>
+          </p:cNvSpPr>
+          <p:nvPr>
+            <p:ph type="title"/>
+          </p:nvPr>
+        </p:nvSpPr>
+        <p:spPr/>
+        <p:txBody>
+          <a:bodyPr>
+            <a:normAutofit/>
+          </a:bodyPr>
+          <a:lstStyle/>
+          <a:p>
+            <a:r>
+              <a:rPr lang="en-US" dirty="0" smtClean="0">
+                <a:solidFill>
+                  <a:srgbClr val="FF0000"/>
+                </a:solidFill>
+              </a:rPr>
+              <a:t>The project</a:t>
+            </a:r>
+            <a:endParaRPr lang="en-US" dirty="0">
+              <a:solidFill>
+                <a:srgbClr val="FF0000"/>
+              </a:solidFill>
+            </a:endParaRPr>
+          </a:p>
+        </p:txBody>
+      </p:sp>
+      <p:sp>
+        <p:nvSpPr>
+          <p:cNvPr id="3" name="Content Placeholder 2"/>
+          <p:cNvSpPr>
+            <a:spLocks noGrp="1"/>
+          </p:cNvSpPr>
+          <p:nvPr>
+            <p:ph idx="1"/>
+          </p:nvPr>
+        </p:nvSpPr>
+        <p:spPr/>
+        <p:txBody>
+          <a:bodyPr/>
+          <a:lstStyle/>
+          <a:p>
+            <a:endParaRPr lang="en-US" dirty="0" smtClean="0"/>
+          </a:p>
+          <a:p>
+            <a:r>
+              <a:rPr lang="en-US" dirty="0" smtClean="0"/>
+              <a:t>Goal:</a:t>
+            </a:r>
+          </a:p>
+          <a:p>
+            <a:pPr lvl="1"/>
+            <a:r>
+              <a:rPr lang="en-US" dirty="0" smtClean="0">
+                <a:solidFill>
+                  <a:schemeClr val="bg1">
+                    <a:lumMod val="75000"/>
+                  </a:schemeClr>
+                </a:solidFill>
+              </a:rPr>
+              <a:t>Unsupervised morphology</a:t>
+            </a:r>
+          </a:p>
+          <a:p>
+            <a:pPr lvl="1"/>
+            <a:r>
+              <a:rPr lang="en-US" dirty="0" smtClean="0">
+                <a:solidFill>
+                  <a:schemeClr val="bg1">
+                    <a:lumMod val="75000"/>
+                  </a:schemeClr>
+                </a:solidFill>
+              </a:rPr>
+              <a:t>Creating rules by comparing items in a vocabulary</a:t>
+            </a:r>
+          </a:p>
+          <a:p>
+            <a:pPr lvl="1"/>
+            <a:r>
+              <a:rPr lang="en-US" dirty="0" smtClean="0"/>
+              <a:t>Using word embeddings to support these rules </a:t>
+            </a:r>
+          </a:p>
+          <a:p>
+            <a:pPr lvl="1"/>
+            <a:endParaRPr lang="en-US" dirty="0"/>
+          </a:p>
+        </p:txBody>
+      </p:sp>
+    </p:spTree>
+    <p:extLst>
+      <p:ext uri="{BB962C8B-B14F-4D97-AF65-F5344CB8AC3E}">
+        <p14:creationId xmlns:p14="http://schemas.microsoft.com/office/powerpoint/2010/main" val="3503051047"/>
+      </p:ext>
+    </p:extLst>
+  </p:cSld>
+  <p:clrMapOvr>
+    <a:masterClrMapping/>
+  </p:clrMapOvr>
+  <p:timing>
+    <p:tnLst>
+      <p:par>
+        <p:cTn xmlns:p14="http://schemas.microsoft.com/office/powerpoint/2010/main" id="1" dur="indefinite" restart="never" nodeType="tmRoot"/>
+      </p:par>
+    </p:tnLst>
+  </p:timing>
+</p:sld>
+</file>
+
+<file path=ppt/slides/slide14.xml><?xml version="1.0" encoding="utf-8"?>
+<p:sld xmlns:a="http://schemas.openxmlformats.org/drawingml/2006/main" xmlns:r="http://schemas.openxmlformats.org/officeDocument/2006/relationships" xmlns:p="http://schemas.openxmlformats.org/presentationml/2006/main">
+  <p:cSld>
+    <p:spTree>
+      <p:nvGrpSpPr>
+        <p:cNvPr id="1" name=""/>
+        <p:cNvGrpSpPr/>
+        <p:nvPr/>
+      </p:nvGrpSpPr>
+      <p:grpSpPr>
+        <a:xfrm>
+          <a:off x="0" y="0"/>
+          <a:ext cx="0" cy="0"/>
+          <a:chOff x="0" y="0"/>
+          <a:chExt cx="0" cy="0"/>
+        </a:xfrm>
+      </p:grpSpPr>
+      <p:sp>
+        <p:nvSpPr>
+          <p:cNvPr id="2" name="Title 1"/>
+          <p:cNvSpPr>
+            <a:spLocks noGrp="1"/>
+          </p:cNvSpPr>
+          <p:nvPr>
+            <p:ph type="title"/>
+          </p:nvPr>
+        </p:nvSpPr>
+        <p:spPr/>
+        <p:txBody>
+          <a:bodyPr/>
+          <a:lstStyle/>
+          <a:p>
+            <a:endParaRPr lang="en-US"/>
+          </a:p>
+        </p:txBody>
+      </p:sp>
+      <p:sp>
+        <p:nvSpPr>
+          <p:cNvPr id="3" name="Content Placeholder 2"/>
+          <p:cNvSpPr>
+            <a:spLocks noGrp="1"/>
+          </p:cNvSpPr>
+          <p:nvPr>
+            <p:ph idx="1"/>
+          </p:nvPr>
+        </p:nvSpPr>
+        <p:spPr/>
+        <p:txBody>
+          <a:bodyPr/>
+          <a:lstStyle/>
+          <a:p>
+            <a:endParaRPr lang="en-US"/>
+          </a:p>
+        </p:txBody>
+      </p:sp>
+    </p:spTree>
+    <p:extLst>
+      <p:ext uri="{BB962C8B-B14F-4D97-AF65-F5344CB8AC3E}">
+        <p14:creationId xmlns:p14="http://schemas.microsoft.com/office/powerpoint/2010/main" val="2668765130"/>
+      </p:ext>
+    </p:extLst>
+  </p:cSld>
+  <p:clrMapOvr>
+    <a:masterClrMapping/>
+  </p:clrMapOvr>
+</p:sld>
+</file>
+
 <file path=ppt/slides/slide2.xml><?xml version="1.0" encoding="utf-8"?>
 <p:sld xmlns:a="http://schemas.openxmlformats.org/drawingml/2006/main" xmlns:r="http://schemas.openxmlformats.org/officeDocument/2006/relationships" xmlns:p="http://schemas.openxmlformats.org/presentationml/2006/main">
   <p:cSld>
@@ -3914,15 +4005,7 @@
             <a:pPr lvl="1"/>
             <a:r>
               <a:rPr lang="en-US" dirty="0" smtClean="0"/>
-              <a:t>Using word </a:t>
-            </a:r>
-            <a:r>
-              <a:rPr lang="en-US" dirty="0" smtClean="0"/>
-              <a:t>embeddings</a:t>
-            </a:r>
-            <a:r>
-              <a:rPr lang="en-US" dirty="0" smtClean="0"/>
-              <a:t> to support these rules </a:t>
+              <a:t>Using word embeddings to support these rules </a:t>
             </a:r>
           </a:p>
           <a:p>
@@ -4052,23 +4135,7 @@
                   <a:srgbClr val="BFBFBF"/>
                 </a:solidFill>
               </a:rPr>
-              <a:t>Using word </a:t>
-            </a:r>
-            <a:r>
-              <a:rPr lang="en-US" dirty="0" smtClean="0">
-                <a:solidFill>
-                  <a:srgbClr val="BFBFBF"/>
-                </a:solidFill>
-              </a:rPr>
-              <a:t>embeddings</a:t>
-            </a:r>
-            <a:r>
-              <a:rPr lang="en-US" dirty="0" smtClean="0">
-                <a:solidFill>
-                  <a:srgbClr val="BFBFBF"/>
-                </a:solidFill>
-              </a:rPr>
-              <a:t> to support these rules </a:t>
+              <a:t>Using word embeddings to support these rules </a:t>
             </a:r>
           </a:p>
           <a:p>
@@ -4374,13 +4441,8 @@
             </a:pPr>
             <a:r>
               <a:rPr lang="en-US" sz="2800" dirty="0" smtClean="0"/>
-              <a:t>English: suffixes &amp; </a:t>
-            </a:r>
-            <a:r>
-              <a:rPr lang="en-US" sz="2800" dirty="0" smtClean="0"/>
-              <a:t>prefixes</a:t>
-            </a:r>
-            <a:endParaRPr lang="en-US" sz="2800" dirty="0" smtClean="0"/>
+              <a:t>English: suffixes &amp; prefixes</a:t>
+            </a:r>
           </a:p>
           <a:p>
             <a:pPr marL="1200150" lvl="2" indent="-285750">
@@ -4389,27 +4451,14 @@
             </a:pPr>
             <a:r>
               <a:rPr lang="en-US" sz="2800" dirty="0" smtClean="0"/>
-              <a:t>car:cars</a:t>
-            </a:r>
-            <a:r>
-              <a:rPr lang="en-US" sz="2800" dirty="0" smtClean="0"/>
-              <a:t> </a:t>
+              <a:t>car:cars </a:t>
             </a:r>
             <a:r>
               <a:rPr lang="en-US" sz="2800" dirty="0" smtClean="0">
                 <a:sym typeface="Wingdings"/>
               </a:rPr>
-              <a:t> </a:t>
-            </a:r>
-            <a:r>
-              <a:rPr lang="en-US" sz="2800" dirty="0" smtClean="0">
-                <a:sym typeface="Wingdings"/>
-              </a:rPr>
-              <a:t>suffix:ø:s</a:t>
-            </a:r>
-            <a:endParaRPr lang="en-US" sz="2800" dirty="0" smtClean="0">
-              <a:sym typeface="Wingdings"/>
-            </a:endParaRPr>
+              <a:t> suffix:ø:s</a:t>
+            </a:r>
           </a:p>
           <a:p>
             <a:pPr marL="1200150" lvl="2" indent="-285750">
@@ -4420,19 +4469,7 @@
               <a:rPr lang="en-US" sz="2800" dirty="0" smtClean="0">
                 <a:sym typeface="Wingdings"/>
               </a:rPr>
-              <a:t>insufficient:sufficient</a:t>
-            </a:r>
-            <a:r>
-              <a:rPr lang="en-US" sz="2800" dirty="0" smtClean="0">
-                <a:sym typeface="Wingdings"/>
-              </a:rPr>
-              <a:t>  </a:t>
-            </a:r>
-            <a:r>
-              <a:rPr lang="en-US" sz="2800" dirty="0" smtClean="0">
-                <a:sym typeface="Wingdings"/>
-              </a:rPr>
-              <a:t>prefix:in:ø</a:t>
+              <a:t>insufficient:sufficient  prefix:in:ø</a:t>
             </a:r>
             <a:endParaRPr lang="en-US" sz="2800" dirty="0">
               <a:sym typeface="Wingdings"/>
@@ -4721,11 +4758,7 @@
             <a:pPr lvl="1"/>
             <a:r>
               <a:rPr lang="en-US" dirty="0" smtClean="0"/>
-              <a:t>Infixation</a:t>
-            </a:r>
-            <a:r>
-              <a:rPr lang="en-US" dirty="0" smtClean="0"/>
-              <a:t>:</a:t>
+              <a:t>Infixation:</a:t>
             </a:r>
           </a:p>
           <a:p>
@@ -4734,7 +4767,6 @@
               <a:rPr lang="en-US" i="1" dirty="0" smtClean="0"/>
               <a:t>Arabic: </a:t>
             </a:r>
-            <a:endParaRPr lang="en-US" i="1" dirty="0" smtClean="0"/>
           </a:p>
           <a:p>
             <a:pPr lvl="3"/>
@@ -4744,73 +4776,31 @@
             </a:r>
             <a:r>
               <a:rPr lang="en-US" sz="2200" dirty="0" smtClean="0"/>
-              <a:t> </a:t>
-            </a:r>
-            <a:r>
-              <a:rPr lang="en-US" sz="2200" dirty="0" smtClean="0"/>
-              <a:t>– </a:t>
-            </a:r>
-            <a:r>
-              <a:rPr lang="en-US" sz="2200" dirty="0" smtClean="0"/>
-              <a:t>katib</a:t>
-            </a:r>
-            <a:r>
-              <a:rPr lang="en-US" sz="2200" dirty="0" smtClean="0"/>
-              <a:t> </a:t>
+              <a:t> – katib </a:t>
             </a:r>
             <a:r>
               <a:rPr lang="en-US" sz="2200" dirty="0" smtClean="0">
                 <a:sym typeface="Wingdings"/>
               </a:rPr>
-              <a:t> infix:_i_a_:_</a:t>
+              <a:t> infix:_i_a_:_a_i_</a:t>
+            </a:r>
+            <a:endParaRPr lang="en-US" sz="2200" i="1" dirty="0"/>
+          </a:p>
+          <a:p>
+            <a:pPr lvl="3"/>
+            <a:r>
+              <a:rPr lang="en-US" sz="2200" dirty="0" err="1" smtClean="0"/>
+              <a:t>kitab</a:t>
+            </a:r>
+            <a:r>
+              <a:rPr lang="en-US" sz="2200" dirty="0" smtClean="0"/>
+              <a:t> – uktibu </a:t>
             </a:r>
             <a:r>
               <a:rPr lang="en-US" sz="2200" dirty="0" smtClean="0">
                 <a:sym typeface="Wingdings"/>
               </a:rPr>
-              <a:t>a_i</a:t>
-            </a:r>
-            <a:r>
-              <a:rPr lang="en-US" sz="2200" dirty="0" smtClean="0">
-                <a:sym typeface="Wingdings"/>
-              </a:rPr>
-              <a:t>_</a:t>
-            </a:r>
-            <a:endParaRPr lang="en-US" sz="2200" i="1" dirty="0"/>
-          </a:p>
-          <a:p>
-            <a:pPr lvl="3"/>
-            <a:r>
-              <a:rPr lang="en-US" sz="2200" dirty="0" err="1" smtClean="0"/>
-              <a:t>kitab</a:t>
-            </a:r>
-            <a:r>
-              <a:rPr lang="en-US" sz="2200" dirty="0" smtClean="0"/>
-              <a:t> </a:t>
-            </a:r>
-            <a:r>
-              <a:rPr lang="en-US" sz="2200" dirty="0" smtClean="0"/>
-              <a:t>– </a:t>
-            </a:r>
-            <a:r>
-              <a:rPr lang="en-US" sz="2200" dirty="0" smtClean="0"/>
-              <a:t>uktibu</a:t>
-            </a:r>
-            <a:r>
-              <a:rPr lang="en-US" sz="2200" dirty="0" smtClean="0"/>
-              <a:t> </a:t>
-            </a:r>
-            <a:r>
-              <a:rPr lang="en-US" sz="2200" dirty="0" smtClean="0">
-                <a:sym typeface="Wingdings"/>
-              </a:rPr>
-              <a:t> infix:_i_a_:</a:t>
-            </a:r>
-            <a:r>
-              <a:rPr lang="en-US" sz="2200" dirty="0" smtClean="0">
-                <a:sym typeface="Wingdings"/>
-              </a:rPr>
-              <a:t>u__</a:t>
+              <a:t> infix:_i_a_:u__</a:t>
             </a:r>
             <a:r>
               <a:rPr lang="en-US" sz="2200" dirty="0" err="1" smtClean="0">
@@ -4834,43 +4824,7 @@
               <a:rPr lang="en-US" sz="2200" dirty="0" smtClean="0">
                 <a:sym typeface="Wingdings"/>
               </a:rPr>
-              <a:t>kitab</a:t>
-            </a:r>
-            <a:r>
-              <a:rPr lang="en-US" sz="2200" dirty="0" smtClean="0">
-                <a:sym typeface="Wingdings"/>
-              </a:rPr>
-              <a:t> – </a:t>
-            </a:r>
-            <a:r>
-              <a:rPr lang="en-US" sz="2200" dirty="0" smtClean="0">
-                <a:sym typeface="Wingdings"/>
-              </a:rPr>
-              <a:t>mutkab</a:t>
-            </a:r>
-            <a:r>
-              <a:rPr lang="en-US" sz="2200" dirty="0" smtClean="0">
-                <a:sym typeface="Wingdings"/>
-              </a:rPr>
-              <a:t>, </a:t>
-            </a:r>
-            <a:r>
-              <a:rPr lang="en-US" sz="2200" dirty="0" smtClean="0">
-                <a:sym typeface="Wingdings"/>
-              </a:rPr>
-              <a:t>kitab</a:t>
-            </a:r>
-            <a:r>
-              <a:rPr lang="en-US" sz="2200" dirty="0" smtClean="0">
-                <a:sym typeface="Wingdings"/>
-              </a:rPr>
-              <a:t> – </a:t>
-            </a:r>
-            <a:r>
-              <a:rPr lang="en-US" sz="2200" dirty="0" smtClean="0">
-                <a:sym typeface="Wingdings"/>
-              </a:rPr>
-              <a:t>ukattibu</a:t>
+              <a:t>kitab – mutkab, kitab – ukattibu</a:t>
             </a:r>
             <a:r>
               <a:rPr lang="en-US" sz="2200" i="1" dirty="0" smtClean="0">
@@ -5047,15 +5001,7 @@
             </a:r>
             <a:r>
               <a:rPr lang="en-US" dirty="0" smtClean="0"/>
-              <a:t>savani</a:t>
-            </a:r>
-            <a:r>
-              <a:rPr lang="en-US" dirty="0" smtClean="0"/>
-              <a:t> – </a:t>
-            </a:r>
-            <a:r>
-              <a:rPr lang="en-US" dirty="0" smtClean="0"/>
-              <a:t>sava</a:t>
+              <a:t>savani – sava</a:t>
             </a:r>
             <a:r>
               <a:rPr lang="en-US" b="1" dirty="0" smtClean="0"/>
@@ -5063,11 +5009,7 @@
             </a:r>
             <a:r>
               <a:rPr lang="en-US" dirty="0" smtClean="0"/>
-              <a:t>ni</a:t>
-            </a:r>
-            <a:r>
-              <a:rPr lang="en-US" dirty="0" smtClean="0"/>
-              <a:t> </a:t>
+              <a:t>ni </a:t>
             </a:r>
             <a:endParaRPr lang="en-US" i="1" dirty="0"/>
           </a:p>
@@ -5324,31 +5266,7 @@
               <a:rPr lang="en-US" dirty="0" smtClean="0">
                 <a:sym typeface="Wingdings"/>
               </a:rPr>
-              <a:t> ‘</a:t>
-            </a:r>
-            <a:r>
-              <a:rPr lang="en-US" dirty="0" smtClean="0">
-                <a:sym typeface="Wingdings"/>
-              </a:rPr>
-              <a:t>oors</a:t>
-            </a:r>
-            <a:r>
-              <a:rPr lang="en-US" dirty="0" smtClean="0">
-                <a:sym typeface="Wingdings"/>
-              </a:rPr>
-              <a:t>’  </a:t>
-            </a:r>
-            <a:r>
-              <a:rPr lang="en-US" dirty="0" smtClean="0">
-                <a:sym typeface="Wingdings"/>
-              </a:rPr>
-              <a:t>fl</a:t>
-            </a:r>
-            <a:r>
-              <a:rPr lang="en-US" dirty="0" smtClean="0">
-                <a:sym typeface="Wingdings"/>
-              </a:rPr>
-              <a:t>_:m_</a:t>
+              <a:t> ‘oors’  fl_:m_</a:t>
             </a:r>
           </a:p>
           <a:p>
@@ -5371,19 +5289,7 @@
               <a:rPr lang="en-US" dirty="0" smtClean="0">
                 <a:sym typeface="Wingdings"/>
               </a:rPr>
-              <a:t>at - cats  ‘cat’ _</a:t>
-            </a:r>
-            <a:r>
-              <a:rPr lang="en-US" dirty="0" smtClean="0">
-                <a:sym typeface="Wingdings"/>
-              </a:rPr>
-              <a:t>ø</a:t>
-            </a:r>
-            <a:r>
-              <a:rPr lang="en-US" dirty="0" smtClean="0">
-                <a:sym typeface="Wingdings"/>
-              </a:rPr>
-              <a:t>:_s</a:t>
+              <a:t>at - cats  ‘cat’ _ø:_s</a:t>
             </a:r>
           </a:p>
           <a:p>

</xml_diff>